<commit_message>
latest version of course website updated
</commit_message>
<xml_diff>
--- a/readings/kb.pptx
+++ b/readings/kb.pptx
@@ -549,7 +549,7 @@
           <a:p>
             <a:fld id="{7D290233-0DD1-4A80-BB1E-9ADC3556DBB6}" type="datetimeFigureOut">
               <a:rPr lang="en-US" smtClean="0"/>
-              <a:t>8/25/15</a:t>
+              <a:t>8/26/15</a:t>
             </a:fld>
             <a:endParaRPr lang="en-US"/>
           </a:p>
@@ -1160,7 +1160,7 @@
           <a:p>
             <a:fld id="{7D290233-0DD1-4A80-BB1E-9ADC3556DBB6}" type="datetimeFigureOut">
               <a:rPr lang="en-US" smtClean="0"/>
-              <a:t>8/25/15</a:t>
+              <a:t>8/26/15</a:t>
             </a:fld>
             <a:endParaRPr lang="en-US"/>
           </a:p>
@@ -1732,7 +1732,7 @@
           <a:p>
             <a:fld id="{7D290233-0DD1-4A80-BB1E-9ADC3556DBB6}" type="datetimeFigureOut">
               <a:rPr lang="en-US" smtClean="0"/>
-              <a:t>8/25/15</a:t>
+              <a:t>8/26/15</a:t>
             </a:fld>
             <a:endParaRPr lang="en-US"/>
           </a:p>
@@ -2266,7 +2266,7 @@
           <a:p>
             <a:fld id="{7D290233-0DD1-4A80-BB1E-9ADC3556DBB6}" type="datetimeFigureOut">
               <a:rPr lang="en-US" smtClean="0"/>
-              <a:t>8/25/15</a:t>
+              <a:t>8/26/15</a:t>
             </a:fld>
             <a:endParaRPr lang="en-US"/>
           </a:p>
@@ -2668,7 +2668,7 @@
           <a:p>
             <a:fld id="{7D290233-0DD1-4A80-BB1E-9ADC3556DBB6}" type="datetimeFigureOut">
               <a:rPr lang="en-US" smtClean="0"/>
-              <a:t>8/25/15</a:t>
+              <a:t>8/26/15</a:t>
             </a:fld>
             <a:endParaRPr lang="en-US"/>
           </a:p>
@@ -3101,7 +3101,7 @@
           <a:p>
             <a:fld id="{7D290233-0DD1-4A80-BB1E-9ADC3556DBB6}" type="datetimeFigureOut">
               <a:rPr lang="en-US" smtClean="0"/>
-              <a:t>8/25/15</a:t>
+              <a:t>8/26/15</a:t>
             </a:fld>
             <a:endParaRPr lang="en-US"/>
           </a:p>
@@ -3503,7 +3503,7 @@
           <a:p>
             <a:fld id="{7D290233-0DD1-4A80-BB1E-9ADC3556DBB6}" type="datetimeFigureOut">
               <a:rPr lang="en-US" smtClean="0"/>
-              <a:t>8/25/15</a:t>
+              <a:t>8/26/15</a:t>
             </a:fld>
             <a:endParaRPr lang="en-US"/>
           </a:p>
@@ -3977,7 +3977,7 @@
           <a:p>
             <a:fld id="{7D290233-0DD1-4A80-BB1E-9ADC3556DBB6}" type="datetimeFigureOut">
               <a:rPr lang="en-US" smtClean="0"/>
-              <a:t>8/25/15</a:t>
+              <a:t>8/26/15</a:t>
             </a:fld>
             <a:endParaRPr lang="en-US"/>
           </a:p>
@@ -4427,7 +4427,7 @@
           <a:p>
             <a:fld id="{7D290233-0DD1-4A80-BB1E-9ADC3556DBB6}" type="datetimeFigureOut">
               <a:rPr lang="en-US" smtClean="0"/>
-              <a:t>8/25/15</a:t>
+              <a:t>8/26/15</a:t>
             </a:fld>
             <a:endParaRPr lang="en-US"/>
           </a:p>
@@ -4947,7 +4947,7 @@
           <a:p>
             <a:fld id="{7D290233-0DD1-4A80-BB1E-9ADC3556DBB6}" type="datetimeFigureOut">
               <a:rPr lang="en-US" smtClean="0"/>
-              <a:t>8/25/15</a:t>
+              <a:t>8/26/15</a:t>
             </a:fld>
             <a:endParaRPr lang="en-US"/>
           </a:p>
@@ -5667,7 +5667,7 @@
           <a:p>
             <a:fld id="{7D290233-0DD1-4A80-BB1E-9ADC3556DBB6}" type="datetimeFigureOut">
               <a:rPr lang="en-US" smtClean="0"/>
-              <a:t>8/25/15</a:t>
+              <a:t>8/26/15</a:t>
             </a:fld>
             <a:endParaRPr lang="en-US"/>
           </a:p>
@@ -6013,7 +6013,7 @@
           <a:p>
             <a:fld id="{7D290233-0DD1-4A80-BB1E-9ADC3556DBB6}" type="datetimeFigureOut">
               <a:rPr lang="en-US" smtClean="0"/>
-              <a:t>8/25/15</a:t>
+              <a:t>8/26/15</a:t>
             </a:fld>
             <a:endParaRPr lang="en-US"/>
           </a:p>
@@ -6282,7 +6282,7 @@
           <a:p>
             <a:fld id="{7D290233-0DD1-4A80-BB1E-9ADC3556DBB6}" type="datetimeFigureOut">
               <a:rPr lang="en-US" smtClean="0"/>
-              <a:t>8/25/15</a:t>
+              <a:t>8/26/15</a:t>
             </a:fld>
             <a:endParaRPr lang="en-US"/>
           </a:p>
@@ -6839,7 +6839,7 @@
           <a:p>
             <a:fld id="{7D290233-0DD1-4A80-BB1E-9ADC3556DBB6}" type="datetimeFigureOut">
               <a:rPr lang="en-US" smtClean="0"/>
-              <a:t>8/25/15</a:t>
+              <a:t>8/26/15</a:t>
             </a:fld>
             <a:endParaRPr lang="en-US"/>
           </a:p>
@@ -7049,7 +7049,7 @@
           <a:p>
             <a:fld id="{7D290233-0DD1-4A80-BB1E-9ADC3556DBB6}" type="datetimeFigureOut">
               <a:rPr lang="en-US" smtClean="0"/>
-              <a:t>8/25/15</a:t>
+              <a:t>8/26/15</a:t>
             </a:fld>
             <a:endParaRPr lang="en-US"/>
           </a:p>
@@ -7629,7 +7629,12 @@
             <p:ph idx="1"/>
           </p:nvPr>
         </p:nvSpPr>
-        <p:spPr/>
+        <p:spPr>
+          <a:xfrm>
+            <a:off x="900112" y="1910522"/>
+            <a:ext cx="7470845" cy="4154999"/>
+          </a:xfrm>
+        </p:spPr>
         <p:txBody>
           <a:bodyPr/>
           <a:lstStyle/>
@@ -7649,7 +7654,43 @@
             </a:r>
             <a:r>
               <a:rPr lang="en-US" dirty="0"/>
-              <a:t>special kind of database for knowledge management. A knowledge base provides a means for information to be collected, organized, shared, searched and utilized</a:t>
+              <a:t>special kind of database for knowledge management. A knowledge base provides a means for information to be </a:t>
+            </a:r>
+            <a:r>
+              <a:rPr lang="en-US" b="1" dirty="0"/>
+              <a:t>collected</a:t>
+            </a:r>
+            <a:r>
+              <a:rPr lang="en-US" dirty="0"/>
+              <a:t>, </a:t>
+            </a:r>
+            <a:r>
+              <a:rPr lang="en-US" b="1" dirty="0"/>
+              <a:t>organized</a:t>
+            </a:r>
+            <a:r>
+              <a:rPr lang="en-US" dirty="0"/>
+              <a:t>, </a:t>
+            </a:r>
+            <a:r>
+              <a:rPr lang="en-US" b="1" dirty="0"/>
+              <a:t>shared</a:t>
+            </a:r>
+            <a:r>
+              <a:rPr lang="en-US" dirty="0"/>
+              <a:t>, </a:t>
+            </a:r>
+            <a:r>
+              <a:rPr lang="en-US" b="1" dirty="0"/>
+              <a:t>searched</a:t>
+            </a:r>
+            <a:r>
+              <a:rPr lang="en-US" dirty="0"/>
+              <a:t> and </a:t>
+            </a:r>
+            <a:r>
+              <a:rPr lang="en-US" b="1" dirty="0"/>
+              <a:t>utilized</a:t>
             </a:r>
             <a:r>
               <a:rPr lang="en-US" dirty="0" smtClean="0"/>
@@ -8506,12 +8547,24 @@
           </a:xfrm>
         </p:spPr>
         <p:txBody>
-          <a:bodyPr/>
+          <a:bodyPr>
+            <a:normAutofit fontScale="85000" lnSpcReduction="20000"/>
+          </a:bodyPr>
           <a:lstStyle/>
           <a:p>
             <a:r>
               <a:rPr lang="en-US" dirty="0" smtClean="0"/>
-              <a:t>KBs are made up of concepts, instances, and relationships</a:t>
+              <a:t>KBs are made up of concepts, instances, and </a:t>
+            </a:r>
+            <a:r>
+              <a:rPr lang="en-US" dirty="0" smtClean="0"/>
+              <a:t>relationships</a:t>
+            </a:r>
+          </a:p>
+          <a:p>
+            <a:r>
+              <a:rPr lang="en-US" dirty="0" smtClean="0"/>
+              <a:t>Instances are typically articles</a:t>
             </a:r>
             <a:endParaRPr lang="en-US" dirty="0"/>
           </a:p>

</xml_diff>